<commit_message>
made the vaccination diagram a little less thick so hopefully the first section fits on one page.
</commit_message>
<xml_diff>
--- a/diagrams/vaccination diagram.pptx
+++ b/diagrams/vaccination diagram.pptx
@@ -117,18 +117,18 @@
   <pc:docChgLst>
     <pc:chgData name="Chen, David" userId="ca743ca0-a026-471f-bfdf-cc601ae2aa9d" providerId="ADAL" clId="{46B99631-8E1B-4AA4-8B25-9C0E3072D172}"/>
     <pc:docChg chg="undo custSel modSld">
-      <pc:chgData name="Chen, David" userId="ca743ca0-a026-471f-bfdf-cc601ae2aa9d" providerId="ADAL" clId="{46B99631-8E1B-4AA4-8B25-9C0E3072D172}" dt="2023-02-28T18:28:01.366" v="5" actId="208"/>
+      <pc:chgData name="Chen, David" userId="ca743ca0-a026-471f-bfdf-cc601ae2aa9d" providerId="ADAL" clId="{46B99631-8E1B-4AA4-8B25-9C0E3072D172}" dt="2023-03-01T21:20:14.499" v="8" actId="1076"/>
       <pc:docMkLst>
         <pc:docMk/>
       </pc:docMkLst>
       <pc:sldChg chg="modSp mod">
-        <pc:chgData name="Chen, David" userId="ca743ca0-a026-471f-bfdf-cc601ae2aa9d" providerId="ADAL" clId="{46B99631-8E1B-4AA4-8B25-9C0E3072D172}" dt="2023-02-28T18:28:01.366" v="5" actId="208"/>
+        <pc:chgData name="Chen, David" userId="ca743ca0-a026-471f-bfdf-cc601ae2aa9d" providerId="ADAL" clId="{46B99631-8E1B-4AA4-8B25-9C0E3072D172}" dt="2023-03-01T21:20:14.499" v="8" actId="1076"/>
         <pc:sldMkLst>
           <pc:docMk/>
           <pc:sldMk cId="3188284111" sldId="256"/>
         </pc:sldMkLst>
         <pc:spChg chg="mod">
-          <ac:chgData name="Chen, David" userId="ca743ca0-a026-471f-bfdf-cc601ae2aa9d" providerId="ADAL" clId="{46B99631-8E1B-4AA4-8B25-9C0E3072D172}" dt="2023-02-28T18:28:01.366" v="5" actId="208"/>
+          <ac:chgData name="Chen, David" userId="ca743ca0-a026-471f-bfdf-cc601ae2aa9d" providerId="ADAL" clId="{46B99631-8E1B-4AA4-8B25-9C0E3072D172}" dt="2023-03-01T21:20:14.499" v="8" actId="1076"/>
           <ac:spMkLst>
             <pc:docMk/>
             <pc:sldMk cId="3188284111" sldId="256"/>
@@ -136,7 +136,7 @@
           </ac:spMkLst>
         </pc:spChg>
         <pc:cxnChg chg="mod">
-          <ac:chgData name="Chen, David" userId="ca743ca0-a026-471f-bfdf-cc601ae2aa9d" providerId="ADAL" clId="{46B99631-8E1B-4AA4-8B25-9C0E3072D172}" dt="2023-02-28T18:27:12.166" v="0" actId="208"/>
+          <ac:chgData name="Chen, David" userId="ca743ca0-a026-471f-bfdf-cc601ae2aa9d" providerId="ADAL" clId="{46B99631-8E1B-4AA4-8B25-9C0E3072D172}" dt="2023-03-01T21:19:51.187" v="6" actId="14100"/>
           <ac:cxnSpMkLst>
             <pc:docMk/>
             <pc:sldMk cId="3188284111" sldId="256"/>
@@ -280,7 +280,7 @@
           <a:p>
             <a:fld id="{12DA9635-0A8E-4320-BFD1-7C1D2F7CB404}" type="datetimeFigureOut">
               <a:rPr lang="nl-NL" smtClean="0"/>
-              <a:t>28-2-2023</a:t>
+              <a:t>1-3-2023</a:t>
             </a:fld>
             <a:endParaRPr lang="nl-NL"/>
           </a:p>
@@ -450,7 +450,7 @@
           <a:p>
             <a:fld id="{12DA9635-0A8E-4320-BFD1-7C1D2F7CB404}" type="datetimeFigureOut">
               <a:rPr lang="nl-NL" smtClean="0"/>
-              <a:t>28-2-2023</a:t>
+              <a:t>1-3-2023</a:t>
             </a:fld>
             <a:endParaRPr lang="nl-NL"/>
           </a:p>
@@ -630,7 +630,7 @@
           <a:p>
             <a:fld id="{12DA9635-0A8E-4320-BFD1-7C1D2F7CB404}" type="datetimeFigureOut">
               <a:rPr lang="nl-NL" smtClean="0"/>
-              <a:t>28-2-2023</a:t>
+              <a:t>1-3-2023</a:t>
             </a:fld>
             <a:endParaRPr lang="nl-NL"/>
           </a:p>
@@ -800,7 +800,7 @@
           <a:p>
             <a:fld id="{12DA9635-0A8E-4320-BFD1-7C1D2F7CB404}" type="datetimeFigureOut">
               <a:rPr lang="nl-NL" smtClean="0"/>
-              <a:t>28-2-2023</a:t>
+              <a:t>1-3-2023</a:t>
             </a:fld>
             <a:endParaRPr lang="nl-NL"/>
           </a:p>
@@ -1046,7 +1046,7 @@
           <a:p>
             <a:fld id="{12DA9635-0A8E-4320-BFD1-7C1D2F7CB404}" type="datetimeFigureOut">
               <a:rPr lang="nl-NL" smtClean="0"/>
-              <a:t>28-2-2023</a:t>
+              <a:t>1-3-2023</a:t>
             </a:fld>
             <a:endParaRPr lang="nl-NL"/>
           </a:p>
@@ -1278,7 +1278,7 @@
           <a:p>
             <a:fld id="{12DA9635-0A8E-4320-BFD1-7C1D2F7CB404}" type="datetimeFigureOut">
               <a:rPr lang="nl-NL" smtClean="0"/>
-              <a:t>28-2-2023</a:t>
+              <a:t>1-3-2023</a:t>
             </a:fld>
             <a:endParaRPr lang="nl-NL"/>
           </a:p>
@@ -1645,7 +1645,7 @@
           <a:p>
             <a:fld id="{12DA9635-0A8E-4320-BFD1-7C1D2F7CB404}" type="datetimeFigureOut">
               <a:rPr lang="nl-NL" smtClean="0"/>
-              <a:t>28-2-2023</a:t>
+              <a:t>1-3-2023</a:t>
             </a:fld>
             <a:endParaRPr lang="nl-NL"/>
           </a:p>
@@ -1763,7 +1763,7 @@
           <a:p>
             <a:fld id="{12DA9635-0A8E-4320-BFD1-7C1D2F7CB404}" type="datetimeFigureOut">
               <a:rPr lang="nl-NL" smtClean="0"/>
-              <a:t>28-2-2023</a:t>
+              <a:t>1-3-2023</a:t>
             </a:fld>
             <a:endParaRPr lang="nl-NL"/>
           </a:p>
@@ -1858,7 +1858,7 @@
           <a:p>
             <a:fld id="{12DA9635-0A8E-4320-BFD1-7C1D2F7CB404}" type="datetimeFigureOut">
               <a:rPr lang="nl-NL" smtClean="0"/>
-              <a:t>28-2-2023</a:t>
+              <a:t>1-3-2023</a:t>
             </a:fld>
             <a:endParaRPr lang="nl-NL"/>
           </a:p>
@@ -2135,7 +2135,7 @@
           <a:p>
             <a:fld id="{12DA9635-0A8E-4320-BFD1-7C1D2F7CB404}" type="datetimeFigureOut">
               <a:rPr lang="nl-NL" smtClean="0"/>
-              <a:t>28-2-2023</a:t>
+              <a:t>1-3-2023</a:t>
             </a:fld>
             <a:endParaRPr lang="nl-NL"/>
           </a:p>
@@ -2392,7 +2392,7 @@
           <a:p>
             <a:fld id="{12DA9635-0A8E-4320-BFD1-7C1D2F7CB404}" type="datetimeFigureOut">
               <a:rPr lang="nl-NL" smtClean="0"/>
-              <a:t>28-2-2023</a:t>
+              <a:t>1-3-2023</a:t>
             </a:fld>
             <a:endParaRPr lang="nl-NL"/>
           </a:p>
@@ -2605,7 +2605,7 @@
           <a:p>
             <a:fld id="{12DA9635-0A8E-4320-BFD1-7C1D2F7CB404}" type="datetimeFigureOut">
               <a:rPr lang="nl-NL" smtClean="0"/>
-              <a:t>28-2-2023</a:t>
+              <a:t>1-3-2023</a:t>
             </a:fld>
             <a:endParaRPr lang="nl-NL"/>
           </a:p>
@@ -3256,7 +3256,7 @@
           </a:xfrm>
           <a:prstGeom prst="bentConnector3">
             <a:avLst>
-              <a:gd name="adj1" fmla="val 5280795"/>
+              <a:gd name="adj1" fmla="val 2931323"/>
             </a:avLst>
           </a:prstGeom>
           <a:ln w="76200">
@@ -3295,7 +3295,7 @@
         </p:nvSpPr>
         <p:spPr>
           <a:xfrm>
-            <a:off x="3692069" y="2578388"/>
+            <a:off x="3692069" y="2365948"/>
             <a:ext cx="2184063" cy="584775"/>
           </a:xfrm>
           <a:prstGeom prst="rect">

</xml_diff>